<commit_message>
added text to poster
</commit_message>
<xml_diff>
--- a/poster.pptx
+++ b/poster.pptx
@@ -6250,10 +6250,16 @@
               <a:t> </a:t>
             </a:r>
             <a:r>
+              <a:rPr lang="de-DE" sz="2800" dirty="0" smtClean="0">
+                <a:latin typeface="Arial Narrow" charset="0"/>
+              </a:rPr>
+              <a:t>non	</a:t>
+            </a:r>
+            <a:r>
               <a:rPr lang="de-DE" sz="2800" dirty="0" err="1" smtClean="0">
                 <a:latin typeface="Arial Narrow" charset="0"/>
               </a:rPr>
-              <a:t>nonumy</a:t>
+              <a:t>umy</a:t>
             </a:r>
             <a:r>
               <a:rPr lang="de-DE" sz="2800" dirty="0" smtClean="0">
@@ -7123,14 +7129,10 @@
           <a:p>
             <a:r>
               <a:rPr lang="de-DE" sz="2800" dirty="0"/>
-              <a:t>Das Ergebnis dieser Arbeit ist ein </a:t>
-            </a:r>
-            <a:r>
-              <a:rPr lang="de-DE" sz="2800"/>
-              <a:t>Konzept </a:t>
-            </a:r>
-            <a:r>
-              <a:rPr lang="de-DE" sz="2800" smtClean="0"/>
+              <a:t>Das Ergebnis dieser Arbeit ist ein Konzept </a:t>
+            </a:r>
+            <a:r>
+              <a:rPr lang="de-DE" sz="2800" dirty="0" smtClean="0"/>
               <a:t>für </a:t>
             </a:r>
             <a:r>

</xml_diff>